<commit_message>
looks fine so far
</commit_message>
<xml_diff>
--- a/docs/presentation.pptx
+++ b/docs/presentation.pptx
@@ -17,8 +17,9 @@
     <p:sldId id="265" r:id="rId11"/>
     <p:sldId id="267" r:id="rId12"/>
     <p:sldId id="266" r:id="rId13"/>
-    <p:sldId id="268" r:id="rId14"/>
-    <p:sldId id="269" r:id="rId15"/>
+    <p:sldId id="270" r:id="rId14"/>
+    <p:sldId id="268" r:id="rId15"/>
+    <p:sldId id="269" r:id="rId16"/>
   </p:sldIdLst>
   <p:sldSz cx="12192000" cy="6858000"/>
   <p:notesSz cx="6858000" cy="9144000"/>
@@ -117,6 +118,11 @@
       </a:defRPr>
     </a:lvl9pPr>
   </p:defaultTextStyle>
+  <p:extLst>
+    <p:ext uri="{EFAFB233-063F-42B5-8137-9DF3F51BA10A}">
+      <p15:sldGuideLst xmlns:p15="http://schemas.microsoft.com/office/powerpoint/2012/main"/>
+    </p:ext>
+  </p:extLst>
 </p:presentation>
 </file>
 
@@ -269,7 +275,7 @@
           <a:p>
             <a:fld id="{DE26352D-1AC4-4859-98DB-F1D4B339FAA6}" type="datetimeFigureOut">
               <a:rPr lang="en-GB" smtClean="0"/>
-              <a:t>19/12/2019</a:t>
+              <a:t>20/12/2019</a:t>
             </a:fld>
             <a:endParaRPr lang="en-GB"/>
           </a:p>
@@ -469,7 +475,7 @@
           <a:p>
             <a:fld id="{DE26352D-1AC4-4859-98DB-F1D4B339FAA6}" type="datetimeFigureOut">
               <a:rPr lang="en-GB" smtClean="0"/>
-              <a:t>19/12/2019</a:t>
+              <a:t>20/12/2019</a:t>
             </a:fld>
             <a:endParaRPr lang="en-GB"/>
           </a:p>
@@ -679,7 +685,7 @@
           <a:p>
             <a:fld id="{DE26352D-1AC4-4859-98DB-F1D4B339FAA6}" type="datetimeFigureOut">
               <a:rPr lang="en-GB" smtClean="0"/>
-              <a:t>19/12/2019</a:t>
+              <a:t>20/12/2019</a:t>
             </a:fld>
             <a:endParaRPr lang="en-GB"/>
           </a:p>
@@ -879,7 +885,7 @@
           <a:p>
             <a:fld id="{DE26352D-1AC4-4859-98DB-F1D4B339FAA6}" type="datetimeFigureOut">
               <a:rPr lang="en-GB" smtClean="0"/>
-              <a:t>19/12/2019</a:t>
+              <a:t>20/12/2019</a:t>
             </a:fld>
             <a:endParaRPr lang="en-GB"/>
           </a:p>
@@ -1155,7 +1161,7 @@
           <a:p>
             <a:fld id="{DE26352D-1AC4-4859-98DB-F1D4B339FAA6}" type="datetimeFigureOut">
               <a:rPr lang="en-GB" smtClean="0"/>
-              <a:t>19/12/2019</a:t>
+              <a:t>20/12/2019</a:t>
             </a:fld>
             <a:endParaRPr lang="en-GB"/>
           </a:p>
@@ -1423,7 +1429,7 @@
           <a:p>
             <a:fld id="{DE26352D-1AC4-4859-98DB-F1D4B339FAA6}" type="datetimeFigureOut">
               <a:rPr lang="en-GB" smtClean="0"/>
-              <a:t>19/12/2019</a:t>
+              <a:t>20/12/2019</a:t>
             </a:fld>
             <a:endParaRPr lang="en-GB"/>
           </a:p>
@@ -1838,7 +1844,7 @@
           <a:p>
             <a:fld id="{DE26352D-1AC4-4859-98DB-F1D4B339FAA6}" type="datetimeFigureOut">
               <a:rPr lang="en-GB" smtClean="0"/>
-              <a:t>19/12/2019</a:t>
+              <a:t>20/12/2019</a:t>
             </a:fld>
             <a:endParaRPr lang="en-GB"/>
           </a:p>
@@ -1980,7 +1986,7 @@
           <a:p>
             <a:fld id="{DE26352D-1AC4-4859-98DB-F1D4B339FAA6}" type="datetimeFigureOut">
               <a:rPr lang="en-GB" smtClean="0"/>
-              <a:t>19/12/2019</a:t>
+              <a:t>20/12/2019</a:t>
             </a:fld>
             <a:endParaRPr lang="en-GB"/>
           </a:p>
@@ -2093,7 +2099,7 @@
           <a:p>
             <a:fld id="{DE26352D-1AC4-4859-98DB-F1D4B339FAA6}" type="datetimeFigureOut">
               <a:rPr lang="en-GB" smtClean="0"/>
-              <a:t>19/12/2019</a:t>
+              <a:t>20/12/2019</a:t>
             </a:fld>
             <a:endParaRPr lang="en-GB"/>
           </a:p>
@@ -2406,7 +2412,7 @@
           <a:p>
             <a:fld id="{DE26352D-1AC4-4859-98DB-F1D4B339FAA6}" type="datetimeFigureOut">
               <a:rPr lang="en-GB" smtClean="0"/>
-              <a:t>19/12/2019</a:t>
+              <a:t>20/12/2019</a:t>
             </a:fld>
             <a:endParaRPr lang="en-GB"/>
           </a:p>
@@ -2695,7 +2701,7 @@
           <a:p>
             <a:fld id="{DE26352D-1AC4-4859-98DB-F1D4B339FAA6}" type="datetimeFigureOut">
               <a:rPr lang="en-GB" smtClean="0"/>
-              <a:t>19/12/2019</a:t>
+              <a:t>20/12/2019</a:t>
             </a:fld>
             <a:endParaRPr lang="en-GB"/>
           </a:p>
@@ -2938,7 +2944,7 @@
           <a:p>
             <a:fld id="{DE26352D-1AC4-4859-98DB-F1D4B339FAA6}" type="datetimeFigureOut">
               <a:rPr lang="en-GB" smtClean="0"/>
-              <a:t>19/12/2019</a:t>
+              <a:t>20/12/2019</a:t>
             </a:fld>
             <a:endParaRPr lang="en-GB"/>
           </a:p>
@@ -3811,6 +3817,219 @@
           <p:cNvPr id="2" name="Titlu 1">
             <a:extLst>
               <a:ext uri="{FF2B5EF4-FFF2-40B4-BE49-F238E27FC236}">
+                <a16:creationId xmlns:a16="http://schemas.microsoft.com/office/drawing/2014/main" id="{34178D88-9E87-43BD-9749-D57C7962686B}"/>
+              </a:ext>
+            </a:extLst>
+          </p:cNvPr>
+          <p:cNvSpPr>
+            <a:spLocks noGrp="1"/>
+          </p:cNvSpPr>
+          <p:nvPr>
+            <p:ph type="title"/>
+          </p:nvPr>
+        </p:nvSpPr>
+        <p:spPr/>
+        <p:txBody>
+          <a:bodyPr/>
+          <a:lstStyle/>
+          <a:p>
+            <a:endParaRPr lang="en-GB"/>
+          </a:p>
+        </p:txBody>
+      </p:sp>
+      <p:sp>
+        <p:nvSpPr>
+          <p:cNvPr id="3" name="Substituent conținut 2">
+            <a:extLst>
+              <a:ext uri="{FF2B5EF4-FFF2-40B4-BE49-F238E27FC236}">
+                <a16:creationId xmlns:a16="http://schemas.microsoft.com/office/drawing/2014/main" id="{DFCA91DF-E65F-4EFA-9ECD-CB49EE2BF98D}"/>
+              </a:ext>
+            </a:extLst>
+          </p:cNvPr>
+          <p:cNvSpPr>
+            <a:spLocks noGrp="1"/>
+          </p:cNvSpPr>
+          <p:nvPr>
+            <p:ph idx="1"/>
+          </p:nvPr>
+        </p:nvSpPr>
+        <p:spPr/>
+        <p:txBody>
+          <a:bodyPr>
+            <a:normAutofit fontScale="47500" lnSpcReduction="20000"/>
+          </a:bodyPr>
+          <a:lstStyle/>
+          <a:p>
+            <a:r>
+              <a:rPr lang="en-US" dirty="0"/>
+              <a:t>Ray</a:t>
+            </a:r>
+          </a:p>
+          <a:p>
+            <a:r>
+              <a:rPr lang="en-US" dirty="0"/>
+              <a:t>Very powerful framework for distributed processing</a:t>
+            </a:r>
+          </a:p>
+          <a:p>
+            <a:r>
+              <a:rPr lang="en-US" dirty="0"/>
+              <a:t>Has support for any cloud provider, Kubernetes </a:t>
+            </a:r>
+            <a:r>
+              <a:rPr lang="en-US" dirty="0" err="1"/>
+              <a:t>cluser</a:t>
+            </a:r>
+            <a:r>
+              <a:rPr lang="en-US" dirty="0"/>
+              <a:t>. 9K stars on </a:t>
+            </a:r>
+            <a:r>
+              <a:rPr lang="en-US" dirty="0" err="1"/>
+              <a:t>github</a:t>
+            </a:r>
+            <a:endParaRPr lang="en-US" dirty="0"/>
+          </a:p>
+          <a:p>
+            <a:r>
+              <a:rPr lang="en-US" dirty="0"/>
+              <a:t>Has authentication, but the actual data is not encrypted</a:t>
+            </a:r>
+          </a:p>
+          <a:p>
+            <a:r>
+              <a:rPr lang="en-US" dirty="0"/>
+              <a:t>Is similar to what I am currently doing. Not sure why I haven’t picked this method in the first place.</a:t>
+            </a:r>
+          </a:p>
+          <a:p>
+            <a:r>
+              <a:rPr lang="en-GB" dirty="0"/>
+              <a:t>Easy to define functions, has nice serialization </a:t>
+            </a:r>
+          </a:p>
+          <a:p>
+            <a:r>
+              <a:rPr lang="en-GB" dirty="0"/>
+              <a:t>Not sure how it handles large data or the nodes behind NATs or network discovery (broker pattern)</a:t>
+            </a:r>
+          </a:p>
+          <a:p>
+            <a:r>
+              <a:rPr lang="en-GB" dirty="0"/>
+              <a:t>Not sure on which node a function will be executed. What if the node is overloaded with work</a:t>
+            </a:r>
+          </a:p>
+          <a:p>
+            <a:r>
+              <a:rPr lang="en-GB" dirty="0"/>
+              <a:t>Has </a:t>
+            </a:r>
+            <a:r>
+              <a:rPr lang="en-GB" dirty="0" err="1"/>
+              <a:t>autoscaler</a:t>
+            </a:r>
+            <a:r>
+              <a:rPr lang="en-GB" dirty="0"/>
+              <a:t> </a:t>
+            </a:r>
+            <a:r>
+              <a:rPr lang="en-US" dirty="0"/>
+              <a:t> that makes deploying a Ray cluster simple</a:t>
+            </a:r>
+          </a:p>
+          <a:p>
+            <a:r>
+              <a:rPr lang="en-GB" dirty="0"/>
+              <a:t>Has automatic port-forwarding</a:t>
+            </a:r>
+          </a:p>
+          <a:p>
+            <a:r>
+              <a:rPr lang="en-GB" dirty="0"/>
+              <a:t>Not </a:t>
+            </a:r>
+            <a:r>
+              <a:rPr lang="en-GB" dirty="0" err="1"/>
+              <a:t>webbased</a:t>
+            </a:r>
+            <a:r>
+              <a:rPr lang="en-GB" dirty="0"/>
+              <a:t>, thus low interoperability with other languages, however some APIs could still be defined (not sure that this would </a:t>
+            </a:r>
+            <a:r>
+              <a:rPr lang="en-GB"/>
+              <a:t>be necessary)</a:t>
+            </a:r>
+            <a:endParaRPr lang="en-GB" dirty="0"/>
+          </a:p>
+          <a:p>
+            <a:r>
+              <a:rPr lang="en-GB" dirty="0"/>
+              <a:t>Probably I will switch to using this, because the flow of processing might be easier (using generators(coroutines)), or maybe use a hybrid solution that uses this and my method.</a:t>
+            </a:r>
+          </a:p>
+          <a:p>
+            <a:r>
+              <a:rPr lang="en-GB" dirty="0">
+                <a:hlinkClick r:id="rId2"/>
+              </a:rPr>
+              <a:t>https://www.oreilly.com/ideas/ray-a-distributed-execution-framework-for-emerging-ai-applications-full-keynote-post</a:t>
+            </a:r>
+            <a:endParaRPr lang="en-GB" dirty="0"/>
+          </a:p>
+          <a:p>
+            <a:r>
+              <a:rPr lang="en-GB" dirty="0"/>
+              <a:t>Has task dependency graph</a:t>
+            </a:r>
+          </a:p>
+          <a:p>
+            <a:r>
+              <a:rPr lang="en-GB" dirty="0"/>
+              <a:t>No support for Windows. Needs at least Ubuntu subsystem for Windows</a:t>
+            </a:r>
+          </a:p>
+          <a:p>
+            <a:endParaRPr lang="en-GB" dirty="0"/>
+          </a:p>
+        </p:txBody>
+      </p:sp>
+    </p:spTree>
+    <p:extLst>
+      <p:ext uri="{BB962C8B-B14F-4D97-AF65-F5344CB8AC3E}">
+        <p14:creationId xmlns:p14="http://schemas.microsoft.com/office/powerpoint/2010/main" val="143718112"/>
+      </p:ext>
+    </p:extLst>
+  </p:cSld>
+  <p:clrMapOvr>
+    <a:masterClrMapping/>
+  </p:clrMapOvr>
+</p:sld>
+</file>
+
+<file path=ppt/slides/slide14.xml><?xml version="1.0" encoding="utf-8"?>
+<p:sld xmlns:a="http://schemas.openxmlformats.org/drawingml/2006/main" xmlns:r="http://schemas.openxmlformats.org/officeDocument/2006/relationships" xmlns:p="http://schemas.openxmlformats.org/presentationml/2006/main">
+  <p:cSld>
+    <p:spTree>
+      <p:nvGrpSpPr>
+        <p:cNvPr id="1" name=""/>
+        <p:cNvGrpSpPr/>
+        <p:nvPr/>
+      </p:nvGrpSpPr>
+      <p:grpSpPr>
+        <a:xfrm>
+          <a:off x="0" y="0"/>
+          <a:ext cx="0" cy="0"/>
+          <a:chOff x="0" y="0"/>
+          <a:chExt cx="0" cy="0"/>
+        </a:xfrm>
+      </p:grpSpPr>
+      <p:sp>
+        <p:nvSpPr>
+          <p:cNvPr id="2" name="Titlu 1">
+            <a:extLst>
+              <a:ext uri="{FF2B5EF4-FFF2-40B4-BE49-F238E27FC236}">
                 <a16:creationId xmlns:a16="http://schemas.microsoft.com/office/drawing/2014/main" id="{B4F0A37D-FBCA-4966-8CC6-1D669B99782E}"/>
               </a:ext>
             </a:extLst>
@@ -3983,7 +4202,7 @@
 </p:sld>
 </file>
 
-<file path=ppt/slides/slide14.xml><?xml version="1.0" encoding="utf-8"?>
+<file path=ppt/slides/slide15.xml><?xml version="1.0" encoding="utf-8"?>
 <p:sld xmlns:a="http://schemas.openxmlformats.org/drawingml/2006/main" xmlns:r="http://schemas.openxmlformats.org/officeDocument/2006/relationships" xmlns:p="http://schemas.openxmlformats.org/presentationml/2006/main">
   <p:cSld>
     <p:spTree>

</xml_diff>